<commit_message>
Added deployment pipeline and some technical risks to architecture document
</commit_message>
<xml_diff>
--- a/de.rdnp.preflight.architecture/doc/Drawings.pptx
+++ b/de.rdnp.preflight.architecture/doc/Drawings.pptx
@@ -9,6 +9,7 @@
     <p:sldId id="258" r:id="rId3"/>
     <p:sldId id="259" r:id="rId4"/>
     <p:sldId id="260" r:id="rId5"/>
+    <p:sldId id="261" r:id="rId6"/>
   </p:sldIdLst>
   <p:sldSz cx="12192000" cy="6858000"/>
   <p:notesSz cx="6858000" cy="9144000"/>
@@ -9656,6 +9657,1536 @@
 </p:sld>
 </file>
 
+<file path=ppt/slides/slide5.xml><?xml version="1.0" encoding="utf-8"?>
+<p:sld xmlns:a="http://schemas.openxmlformats.org/drawingml/2006/main" xmlns:r="http://schemas.openxmlformats.org/officeDocument/2006/relationships" xmlns:p="http://schemas.openxmlformats.org/presentationml/2006/main">
+  <p:cSld>
+    <p:spTree>
+      <p:nvGrpSpPr>
+        <p:cNvPr id="1" name=""/>
+        <p:cNvGrpSpPr/>
+        <p:nvPr/>
+      </p:nvGrpSpPr>
+      <p:grpSpPr>
+        <a:xfrm>
+          <a:off x="0" y="0"/>
+          <a:ext cx="0" cy="0"/>
+          <a:chOff x="0" y="0"/>
+          <a:chExt cx="0" cy="0"/>
+        </a:xfrm>
+      </p:grpSpPr>
+      <p:sp>
+        <p:nvSpPr>
+          <p:cNvPr id="2" name="Rechteck 1">
+            <a:extLst>
+              <a:ext uri="{FF2B5EF4-FFF2-40B4-BE49-F238E27FC236}">
+                <a16:creationId xmlns:a16="http://schemas.microsoft.com/office/drawing/2014/main" id="{621D4A0E-334D-48A7-A171-7A507A4EB912}"/>
+              </a:ext>
+            </a:extLst>
+          </p:cNvPr>
+          <p:cNvSpPr/>
+          <p:nvPr/>
+        </p:nvSpPr>
+        <p:spPr>
+          <a:xfrm>
+            <a:off x="263236" y="3376622"/>
+            <a:ext cx="5486401" cy="1875097"/>
+          </a:xfrm>
+          <a:prstGeom prst="rect">
+            <a:avLst/>
+          </a:prstGeom>
+        </p:spPr>
+        <p:style>
+          <a:lnRef idx="2">
+            <a:schemeClr val="accent1">
+              <a:shade val="50000"/>
+            </a:schemeClr>
+          </a:lnRef>
+          <a:fillRef idx="1">
+            <a:schemeClr val="accent1"/>
+          </a:fillRef>
+          <a:effectRef idx="0">
+            <a:schemeClr val="accent1"/>
+          </a:effectRef>
+          <a:fontRef idx="minor">
+            <a:schemeClr val="lt1"/>
+          </a:fontRef>
+        </p:style>
+        <p:txBody>
+          <a:bodyPr rtlCol="0" anchor="ctr"/>
+          <a:lstStyle/>
+          <a:p>
+            <a:pPr algn="ctr"/>
+            <a:r>
+              <a:rPr lang="de-DE" dirty="0">
+                <a:solidFill>
+                  <a:schemeClr val="tx1"/>
+                </a:solidFill>
+              </a:rPr>
+              <a:t>Main </a:t>
+            </a:r>
+            <a:r>
+              <a:rPr lang="de-DE" dirty="0" err="1">
+                <a:solidFill>
+                  <a:schemeClr val="tx1"/>
+                </a:solidFill>
+              </a:rPr>
+              <a:t>Application</a:t>
+            </a:r>
+            <a:r>
+              <a:rPr lang="de-DE" dirty="0">
+                <a:solidFill>
+                  <a:schemeClr val="tx1"/>
+                </a:solidFill>
+              </a:rPr>
+              <a:t> Project – Spring </a:t>
+            </a:r>
+            <a:r>
+              <a:rPr lang="de-DE" dirty="0" err="1">
+                <a:solidFill>
+                  <a:schemeClr val="tx1"/>
+                </a:solidFill>
+              </a:rPr>
+              <a:t>Application</a:t>
+            </a:r>
+            <a:endParaRPr lang="de-DE" dirty="0">
+              <a:solidFill>
+                <a:schemeClr val="tx1"/>
+              </a:solidFill>
+            </a:endParaRPr>
+          </a:p>
+          <a:p>
+            <a:pPr algn="ctr"/>
+            <a:r>
+              <a:rPr lang="de-DE" dirty="0" err="1">
+                <a:solidFill>
+                  <a:schemeClr val="tx1"/>
+                </a:solidFill>
+              </a:rPr>
+              <a:t>de.rdnp.preflight.</a:t>
+            </a:r>
+            <a:r>
+              <a:rPr lang="de-DE" i="1" dirty="0" err="1">
+                <a:solidFill>
+                  <a:schemeClr val="tx1"/>
+                </a:solidFill>
+              </a:rPr>
+              <a:t>container</a:t>
+            </a:r>
+            <a:endParaRPr lang="de-DE" i="1" dirty="0">
+              <a:solidFill>
+                <a:schemeClr val="tx1"/>
+              </a:solidFill>
+            </a:endParaRPr>
+          </a:p>
+        </p:txBody>
+      </p:sp>
+      <p:sp>
+        <p:nvSpPr>
+          <p:cNvPr id="3" name="Rechteck 2">
+            <a:extLst>
+              <a:ext uri="{FF2B5EF4-FFF2-40B4-BE49-F238E27FC236}">
+                <a16:creationId xmlns:a16="http://schemas.microsoft.com/office/drawing/2014/main" id="{A0B1B308-88D1-4497-9D9E-E1DE03E993B0}"/>
+              </a:ext>
+            </a:extLst>
+          </p:cNvPr>
+          <p:cNvSpPr/>
+          <p:nvPr/>
+        </p:nvSpPr>
+        <p:spPr>
+          <a:xfrm>
+            <a:off x="263393" y="2103267"/>
+            <a:ext cx="5486400" cy="692728"/>
+          </a:xfrm>
+          <a:prstGeom prst="rect">
+            <a:avLst/>
+          </a:prstGeom>
+        </p:spPr>
+        <p:style>
+          <a:lnRef idx="2">
+            <a:schemeClr val="accent1">
+              <a:shade val="50000"/>
+            </a:schemeClr>
+          </a:lnRef>
+          <a:fillRef idx="1">
+            <a:schemeClr val="accent1"/>
+          </a:fillRef>
+          <a:effectRef idx="0">
+            <a:schemeClr val="accent1"/>
+          </a:effectRef>
+          <a:fontRef idx="minor">
+            <a:schemeClr val="lt1"/>
+          </a:fontRef>
+        </p:style>
+        <p:txBody>
+          <a:bodyPr rtlCol="0" anchor="ctr"/>
+          <a:lstStyle/>
+          <a:p>
+            <a:pPr algn="ctr"/>
+            <a:r>
+              <a:rPr lang="de-DE" dirty="0">
+                <a:solidFill>
+                  <a:schemeClr val="tx1"/>
+                </a:solidFill>
+              </a:rPr>
+              <a:t>UI Project – Angular </a:t>
+            </a:r>
+            <a:r>
+              <a:rPr lang="de-DE" dirty="0" err="1">
+                <a:solidFill>
+                  <a:schemeClr val="tx1"/>
+                </a:solidFill>
+              </a:rPr>
+              <a:t>Application</a:t>
+            </a:r>
+            <a:endParaRPr lang="de-DE" dirty="0">
+              <a:solidFill>
+                <a:schemeClr val="tx1"/>
+              </a:solidFill>
+            </a:endParaRPr>
+          </a:p>
+          <a:p>
+            <a:pPr algn="ctr"/>
+            <a:r>
+              <a:rPr lang="de-DE" dirty="0" err="1">
+                <a:solidFill>
+                  <a:schemeClr val="tx1"/>
+                </a:solidFill>
+              </a:rPr>
+              <a:t>de.rdnp.preflight.</a:t>
+            </a:r>
+            <a:r>
+              <a:rPr lang="de-DE" i="1" dirty="0" err="1">
+                <a:solidFill>
+                  <a:schemeClr val="tx1"/>
+                </a:solidFill>
+              </a:rPr>
+              <a:t>container.</a:t>
+            </a:r>
+            <a:r>
+              <a:rPr lang="de-DE" dirty="0" err="1">
+                <a:solidFill>
+                  <a:schemeClr val="tx1"/>
+                </a:solidFill>
+              </a:rPr>
+              <a:t>webui</a:t>
+            </a:r>
+            <a:endParaRPr lang="de-DE" dirty="0">
+              <a:solidFill>
+                <a:schemeClr val="tx1"/>
+              </a:solidFill>
+            </a:endParaRPr>
+          </a:p>
+        </p:txBody>
+      </p:sp>
+      <p:sp>
+        <p:nvSpPr>
+          <p:cNvPr id="4" name="Rechteck 3">
+            <a:extLst>
+              <a:ext uri="{FF2B5EF4-FFF2-40B4-BE49-F238E27FC236}">
+                <a16:creationId xmlns:a16="http://schemas.microsoft.com/office/drawing/2014/main" id="{E257ECA3-044D-4D1C-9F04-241AA8A10118}"/>
+              </a:ext>
+            </a:extLst>
+          </p:cNvPr>
+          <p:cNvSpPr/>
+          <p:nvPr/>
+        </p:nvSpPr>
+        <p:spPr>
+          <a:xfrm>
+            <a:off x="263236" y="703897"/>
+            <a:ext cx="5486400" cy="692728"/>
+          </a:xfrm>
+          <a:prstGeom prst="rect">
+            <a:avLst/>
+          </a:prstGeom>
+        </p:spPr>
+        <p:style>
+          <a:lnRef idx="2">
+            <a:schemeClr val="accent1">
+              <a:shade val="50000"/>
+            </a:schemeClr>
+          </a:lnRef>
+          <a:fillRef idx="1">
+            <a:schemeClr val="accent1"/>
+          </a:fillRef>
+          <a:effectRef idx="0">
+            <a:schemeClr val="accent1"/>
+          </a:effectRef>
+          <a:fontRef idx="minor">
+            <a:schemeClr val="lt1"/>
+          </a:fontRef>
+        </p:style>
+        <p:txBody>
+          <a:bodyPr rtlCol="0" anchor="ctr"/>
+          <a:lstStyle/>
+          <a:p>
+            <a:pPr algn="ctr"/>
+            <a:r>
+              <a:rPr lang="de-DE" dirty="0">
+                <a:solidFill>
+                  <a:schemeClr val="tx1"/>
+                </a:solidFill>
+              </a:rPr>
+              <a:t>Test Project – Spring </a:t>
+            </a:r>
+            <a:r>
+              <a:rPr lang="de-DE" dirty="0" err="1">
+                <a:solidFill>
+                  <a:schemeClr val="tx1"/>
+                </a:solidFill>
+              </a:rPr>
+              <a:t>Application</a:t>
+            </a:r>
+            <a:r>
+              <a:rPr lang="de-DE" dirty="0">
+                <a:solidFill>
+                  <a:schemeClr val="tx1"/>
+                </a:solidFill>
+              </a:rPr>
+              <a:t> </a:t>
+            </a:r>
+            <a:r>
+              <a:rPr lang="de-DE" dirty="0" err="1">
+                <a:solidFill>
+                  <a:schemeClr val="tx1"/>
+                </a:solidFill>
+              </a:rPr>
+              <a:t>with</a:t>
+            </a:r>
+            <a:r>
+              <a:rPr lang="de-DE" dirty="0">
+                <a:solidFill>
+                  <a:schemeClr val="tx1"/>
+                </a:solidFill>
+              </a:rPr>
+              <a:t> </a:t>
+            </a:r>
+            <a:r>
+              <a:rPr lang="de-DE" dirty="0" err="1">
+                <a:solidFill>
+                  <a:schemeClr val="tx1"/>
+                </a:solidFill>
+              </a:rPr>
+              <a:t>test</a:t>
+            </a:r>
+            <a:r>
+              <a:rPr lang="de-DE" dirty="0">
+                <a:solidFill>
+                  <a:schemeClr val="tx1"/>
+                </a:solidFill>
+              </a:rPr>
+              <a:t> </a:t>
+            </a:r>
+            <a:r>
+              <a:rPr lang="de-DE" dirty="0" err="1">
+                <a:solidFill>
+                  <a:schemeClr val="tx1"/>
+                </a:solidFill>
+              </a:rPr>
+              <a:t>services</a:t>
+            </a:r>
+            <a:endParaRPr lang="de-DE" dirty="0">
+              <a:solidFill>
+                <a:schemeClr val="tx1"/>
+              </a:solidFill>
+            </a:endParaRPr>
+          </a:p>
+          <a:p>
+            <a:pPr algn="ctr"/>
+            <a:r>
+              <a:rPr lang="de-DE" dirty="0" err="1">
+                <a:solidFill>
+                  <a:schemeClr val="tx1"/>
+                </a:solidFill>
+              </a:rPr>
+              <a:t>de.rdnp.preflight.</a:t>
+            </a:r>
+            <a:r>
+              <a:rPr lang="de-DE" i="1" dirty="0" err="1">
+                <a:solidFill>
+                  <a:schemeClr val="tx1"/>
+                </a:solidFill>
+              </a:rPr>
+              <a:t>container.</a:t>
+            </a:r>
+            <a:r>
+              <a:rPr lang="de-DE" dirty="0" err="1">
+                <a:solidFill>
+                  <a:schemeClr val="tx1"/>
+                </a:solidFill>
+              </a:rPr>
+              <a:t>testenv</a:t>
+            </a:r>
+            <a:endParaRPr lang="de-DE" dirty="0">
+              <a:solidFill>
+                <a:schemeClr val="tx1"/>
+              </a:solidFill>
+            </a:endParaRPr>
+          </a:p>
+        </p:txBody>
+      </p:sp>
+      <p:sp>
+        <p:nvSpPr>
+          <p:cNvPr id="7" name="Textfeld 6">
+            <a:extLst>
+              <a:ext uri="{FF2B5EF4-FFF2-40B4-BE49-F238E27FC236}">
+                <a16:creationId xmlns:a16="http://schemas.microsoft.com/office/drawing/2014/main" id="{5CCB9D48-6CE5-45B6-9731-7E2F9E6CAB05}"/>
+              </a:ext>
+            </a:extLst>
+          </p:cNvPr>
+          <p:cNvSpPr txBox="1"/>
+          <p:nvPr/>
+        </p:nvSpPr>
+        <p:spPr>
+          <a:xfrm>
+            <a:off x="124691" y="159679"/>
+            <a:ext cx="6251391" cy="369332"/>
+          </a:xfrm>
+          <a:prstGeom prst="rect">
+            <a:avLst/>
+          </a:prstGeom>
+          <a:noFill/>
+        </p:spPr>
+        <p:txBody>
+          <a:bodyPr wrap="none" rtlCol="0">
+            <a:spAutoFit/>
+          </a:bodyPr>
+          <a:lstStyle/>
+          <a:p>
+            <a:r>
+              <a:rPr lang="de-DE" b="1" dirty="0"/>
+              <a:t>Web-</a:t>
+            </a:r>
+            <a:r>
+              <a:rPr lang="de-DE" b="1" dirty="0" err="1"/>
+              <a:t>Application</a:t>
+            </a:r>
+            <a:r>
+              <a:rPr lang="de-DE" b="1" dirty="0"/>
+              <a:t> Project </a:t>
+            </a:r>
+            <a:r>
+              <a:rPr lang="de-DE" b="1" dirty="0" err="1"/>
+              <a:t>Structure</a:t>
+            </a:r>
+            <a:r>
+              <a:rPr lang="de-DE" b="1" dirty="0"/>
+              <a:t> and </a:t>
+            </a:r>
+            <a:r>
+              <a:rPr lang="de-DE" b="1" dirty="0" err="1"/>
+              <a:t>Build</a:t>
+            </a:r>
+            <a:r>
+              <a:rPr lang="de-DE" b="1" dirty="0"/>
+              <a:t> Pipeline </a:t>
+            </a:r>
+            <a:r>
+              <a:rPr lang="de-DE" b="1" dirty="0" err="1"/>
+              <a:t>Overview</a:t>
+            </a:r>
+            <a:r>
+              <a:rPr lang="de-DE" b="1" dirty="0"/>
+              <a:t> </a:t>
+            </a:r>
+          </a:p>
+        </p:txBody>
+      </p:sp>
+      <p:sp>
+        <p:nvSpPr>
+          <p:cNvPr id="9" name="Pfeil: nach unten 8">
+            <a:extLst>
+              <a:ext uri="{FF2B5EF4-FFF2-40B4-BE49-F238E27FC236}">
+                <a16:creationId xmlns:a16="http://schemas.microsoft.com/office/drawing/2014/main" id="{F051717E-CD3C-4EEA-BFF1-C532B6B1F17C}"/>
+              </a:ext>
+            </a:extLst>
+          </p:cNvPr>
+          <p:cNvSpPr/>
+          <p:nvPr/>
+        </p:nvSpPr>
+        <p:spPr>
+          <a:xfrm>
+            <a:off x="8128169" y="304801"/>
+            <a:ext cx="3800438" cy="6068290"/>
+          </a:xfrm>
+          <a:prstGeom prst="downArrow">
+            <a:avLst>
+              <a:gd name="adj1" fmla="val 59478"/>
+              <a:gd name="adj2" fmla="val 50000"/>
+            </a:avLst>
+          </a:prstGeom>
+        </p:spPr>
+        <p:style>
+          <a:lnRef idx="2">
+            <a:schemeClr val="accent1">
+              <a:shade val="50000"/>
+            </a:schemeClr>
+          </a:lnRef>
+          <a:fillRef idx="1">
+            <a:schemeClr val="accent1"/>
+          </a:fillRef>
+          <a:effectRef idx="0">
+            <a:schemeClr val="accent1"/>
+          </a:effectRef>
+          <a:fontRef idx="minor">
+            <a:schemeClr val="lt1"/>
+          </a:fontRef>
+        </p:style>
+        <p:txBody>
+          <a:bodyPr rtlCol="0" anchor="ctr"/>
+          <a:lstStyle/>
+          <a:p>
+            <a:pPr algn="ctr"/>
+            <a:endParaRPr lang="de-DE"/>
+          </a:p>
+        </p:txBody>
+      </p:sp>
+      <p:sp>
+        <p:nvSpPr>
+          <p:cNvPr id="10" name="Textfeld 9">
+            <a:extLst>
+              <a:ext uri="{FF2B5EF4-FFF2-40B4-BE49-F238E27FC236}">
+                <a16:creationId xmlns:a16="http://schemas.microsoft.com/office/drawing/2014/main" id="{B96C95D4-1518-43A7-B5F6-5BA6B1D86CC4}"/>
+              </a:ext>
+            </a:extLst>
+          </p:cNvPr>
+          <p:cNvSpPr txBox="1"/>
+          <p:nvPr/>
+        </p:nvSpPr>
+        <p:spPr>
+          <a:xfrm rot="5400000">
+            <a:off x="10279853" y="847178"/>
+            <a:ext cx="1463862" cy="369332"/>
+          </a:xfrm>
+          <a:prstGeom prst="rect">
+            <a:avLst/>
+          </a:prstGeom>
+          <a:noFill/>
+        </p:spPr>
+        <p:txBody>
+          <a:bodyPr wrap="none" rtlCol="0">
+            <a:spAutoFit/>
+          </a:bodyPr>
+          <a:lstStyle/>
+          <a:p>
+            <a:r>
+              <a:rPr lang="de-DE" dirty="0" err="1"/>
+              <a:t>Build</a:t>
+            </a:r>
+            <a:r>
+              <a:rPr lang="de-DE" dirty="0"/>
+              <a:t> Pipeline</a:t>
+            </a:r>
+          </a:p>
+        </p:txBody>
+      </p:sp>
+      <p:sp>
+        <p:nvSpPr>
+          <p:cNvPr id="11" name="Rechteck 10">
+            <a:extLst>
+              <a:ext uri="{FF2B5EF4-FFF2-40B4-BE49-F238E27FC236}">
+                <a16:creationId xmlns:a16="http://schemas.microsoft.com/office/drawing/2014/main" id="{DB73179C-B186-490F-B3B7-19EF88FBE970}"/>
+              </a:ext>
+            </a:extLst>
+          </p:cNvPr>
+          <p:cNvSpPr/>
+          <p:nvPr/>
+        </p:nvSpPr>
+        <p:spPr>
+          <a:xfrm>
+            <a:off x="7953639" y="2499402"/>
+            <a:ext cx="1254214" cy="692728"/>
+          </a:xfrm>
+          <a:prstGeom prst="rect">
+            <a:avLst/>
+          </a:prstGeom>
+          <a:solidFill>
+            <a:schemeClr val="tx1"/>
+          </a:solidFill>
+        </p:spPr>
+        <p:style>
+          <a:lnRef idx="2">
+            <a:schemeClr val="accent1">
+              <a:shade val="50000"/>
+            </a:schemeClr>
+          </a:lnRef>
+          <a:fillRef idx="1">
+            <a:schemeClr val="accent1"/>
+          </a:fillRef>
+          <a:effectRef idx="0">
+            <a:schemeClr val="accent1"/>
+          </a:effectRef>
+          <a:fontRef idx="minor">
+            <a:schemeClr val="lt1"/>
+          </a:fontRef>
+        </p:style>
+        <p:txBody>
+          <a:bodyPr rtlCol="0" anchor="ctr"/>
+          <a:lstStyle/>
+          <a:p>
+            <a:pPr algn="ctr"/>
+            <a:r>
+              <a:rPr lang="de-DE" dirty="0">
+                <a:solidFill>
+                  <a:schemeClr val="bg1"/>
+                </a:solidFill>
+              </a:rPr>
+              <a:t>HTML, CSS, JS </a:t>
+            </a:r>
+          </a:p>
+        </p:txBody>
+      </p:sp>
+      <p:grpSp>
+        <p:nvGrpSpPr>
+          <p:cNvPr id="18" name="Gruppieren 17">
+            <a:extLst>
+              <a:ext uri="{FF2B5EF4-FFF2-40B4-BE49-F238E27FC236}">
+                <a16:creationId xmlns:a16="http://schemas.microsoft.com/office/drawing/2014/main" id="{3B288A4C-A69E-45BA-985D-4FDA752BE6F8}"/>
+              </a:ext>
+            </a:extLst>
+          </p:cNvPr>
+          <p:cNvGrpSpPr/>
+          <p:nvPr/>
+        </p:nvGrpSpPr>
+        <p:grpSpPr>
+          <a:xfrm rot="1533681">
+            <a:off x="5500654" y="3113581"/>
+            <a:ext cx="2421904" cy="692728"/>
+            <a:chOff x="5845127" y="2411279"/>
+            <a:chExt cx="2421904" cy="692728"/>
+          </a:xfrm>
+        </p:grpSpPr>
+        <p:sp>
+          <p:nvSpPr>
+            <p:cNvPr id="13" name="Pfeil: nach rechts 12">
+              <a:extLst>
+                <a:ext uri="{FF2B5EF4-FFF2-40B4-BE49-F238E27FC236}">
+                  <a16:creationId xmlns:a16="http://schemas.microsoft.com/office/drawing/2014/main" id="{9843BAAF-8645-4C97-9E5D-804841EF525E}"/>
+                </a:ext>
+              </a:extLst>
+            </p:cNvPr>
+            <p:cNvSpPr/>
+            <p:nvPr/>
+          </p:nvSpPr>
+          <p:spPr>
+            <a:xfrm rot="8613553">
+              <a:off x="5845127" y="2411279"/>
+              <a:ext cx="2421904" cy="692728"/>
+            </a:xfrm>
+            <a:prstGeom prst="rightArrow">
+              <a:avLst/>
+            </a:prstGeom>
+          </p:spPr>
+          <p:style>
+            <a:lnRef idx="2">
+              <a:schemeClr val="accent1">
+                <a:shade val="50000"/>
+              </a:schemeClr>
+            </a:lnRef>
+            <a:fillRef idx="1">
+              <a:schemeClr val="accent1"/>
+            </a:fillRef>
+            <a:effectRef idx="0">
+              <a:schemeClr val="accent1"/>
+            </a:effectRef>
+            <a:fontRef idx="minor">
+              <a:schemeClr val="lt1"/>
+            </a:fontRef>
+          </p:style>
+          <p:txBody>
+            <a:bodyPr rtlCol="0" anchor="ctr"/>
+            <a:lstStyle/>
+            <a:p>
+              <a:pPr algn="ctr"/>
+              <a:endParaRPr lang="de-DE" dirty="0">
+                <a:solidFill>
+                  <a:schemeClr val="tx1"/>
+                </a:solidFill>
+              </a:endParaRPr>
+            </a:p>
+          </p:txBody>
+        </p:sp>
+        <p:sp>
+          <p:nvSpPr>
+            <p:cNvPr id="14" name="Textfeld 13">
+              <a:extLst>
+                <a:ext uri="{FF2B5EF4-FFF2-40B4-BE49-F238E27FC236}">
+                  <a16:creationId xmlns:a16="http://schemas.microsoft.com/office/drawing/2014/main" id="{49F09BC1-0FAB-4D55-8E36-30FBADD18CF1}"/>
+                </a:ext>
+              </a:extLst>
+            </p:cNvPr>
+            <p:cNvSpPr txBox="1"/>
+            <p:nvPr/>
+          </p:nvSpPr>
+          <p:spPr>
+            <a:xfrm rot="19384593">
+              <a:off x="5966177" y="2525591"/>
+              <a:ext cx="2253566" cy="369332"/>
+            </a:xfrm>
+            <a:prstGeom prst="rect">
+              <a:avLst/>
+            </a:prstGeom>
+            <a:noFill/>
+          </p:spPr>
+          <p:txBody>
+            <a:bodyPr wrap="none" rtlCol="0">
+              <a:spAutoFit/>
+            </a:bodyPr>
+            <a:lstStyle/>
+            <a:p>
+              <a:r>
+                <a:rPr lang="de-DE" dirty="0"/>
+                <a:t>Copy </a:t>
+              </a:r>
+              <a:r>
+                <a:rPr lang="de-DE" dirty="0" err="1"/>
+                <a:t>deployables</a:t>
+              </a:r>
+              <a:r>
+                <a:rPr lang="de-DE" dirty="0"/>
+                <a:t> </a:t>
+              </a:r>
+              <a:r>
+                <a:rPr lang="de-DE" dirty="0" err="1"/>
+                <a:t>into</a:t>
+              </a:r>
+              <a:endParaRPr lang="de-DE" dirty="0"/>
+            </a:p>
+          </p:txBody>
+        </p:sp>
+      </p:grpSp>
+      <p:sp>
+        <p:nvSpPr>
+          <p:cNvPr id="16" name="Rechteck 15">
+            <a:extLst>
+              <a:ext uri="{FF2B5EF4-FFF2-40B4-BE49-F238E27FC236}">
+                <a16:creationId xmlns:a16="http://schemas.microsoft.com/office/drawing/2014/main" id="{66E847D8-2E09-4247-8B66-ACC800393F91}"/>
+              </a:ext>
+            </a:extLst>
+          </p:cNvPr>
+          <p:cNvSpPr/>
+          <p:nvPr/>
+        </p:nvSpPr>
+        <p:spPr>
+          <a:xfrm>
+            <a:off x="9259698" y="680629"/>
+            <a:ext cx="1603720" cy="3926310"/>
+          </a:xfrm>
+          <a:prstGeom prst="rect">
+            <a:avLst/>
+          </a:prstGeom>
+          <a:solidFill>
+            <a:schemeClr val="tx1"/>
+          </a:solidFill>
+        </p:spPr>
+        <p:style>
+          <a:lnRef idx="2">
+            <a:schemeClr val="accent1">
+              <a:shade val="50000"/>
+            </a:schemeClr>
+          </a:lnRef>
+          <a:fillRef idx="1">
+            <a:schemeClr val="accent1"/>
+          </a:fillRef>
+          <a:effectRef idx="0">
+            <a:schemeClr val="accent1"/>
+          </a:effectRef>
+          <a:fontRef idx="minor">
+            <a:schemeClr val="lt1"/>
+          </a:fontRef>
+        </p:style>
+        <p:txBody>
+          <a:bodyPr rtlCol="0" anchor="ctr"/>
+          <a:lstStyle/>
+          <a:p>
+            <a:pPr algn="ctr"/>
+            <a:r>
+              <a:rPr lang="de-DE" dirty="0" err="1">
+                <a:solidFill>
+                  <a:schemeClr val="bg1"/>
+                </a:solidFill>
+              </a:rPr>
+              <a:t>Deployable</a:t>
+            </a:r>
+            <a:r>
+              <a:rPr lang="de-DE" dirty="0">
+                <a:solidFill>
+                  <a:schemeClr val="bg1"/>
+                </a:solidFill>
+              </a:rPr>
+              <a:t> Test-JAR</a:t>
+            </a:r>
+          </a:p>
+          <a:p>
+            <a:pPr algn="ctr"/>
+            <a:r>
+              <a:rPr lang="de-DE" dirty="0">
+                <a:solidFill>
+                  <a:schemeClr val="bg1"/>
+                </a:solidFill>
+              </a:rPr>
+              <a:t>w/o UI,</a:t>
+            </a:r>
+          </a:p>
+          <a:p>
+            <a:pPr algn="ctr"/>
+            <a:r>
+              <a:rPr lang="de-DE" dirty="0" err="1">
+                <a:solidFill>
+                  <a:schemeClr val="bg1"/>
+                </a:solidFill>
+              </a:rPr>
+              <a:t>with</a:t>
+            </a:r>
+            <a:r>
+              <a:rPr lang="de-DE" dirty="0">
+                <a:solidFill>
+                  <a:schemeClr val="bg1"/>
+                </a:solidFill>
+              </a:rPr>
+              <a:t> </a:t>
+            </a:r>
+            <a:r>
+              <a:rPr lang="de-DE" dirty="0" err="1">
+                <a:solidFill>
+                  <a:schemeClr val="bg1"/>
+                </a:solidFill>
+              </a:rPr>
+              <a:t>test</a:t>
+            </a:r>
+            <a:r>
+              <a:rPr lang="de-DE" dirty="0">
+                <a:solidFill>
+                  <a:schemeClr val="bg1"/>
+                </a:solidFill>
+              </a:rPr>
+              <a:t> </a:t>
+            </a:r>
+            <a:r>
+              <a:rPr lang="de-DE" dirty="0" err="1">
+                <a:solidFill>
+                  <a:schemeClr val="bg1"/>
+                </a:solidFill>
+              </a:rPr>
+              <a:t>services</a:t>
+            </a:r>
+            <a:endParaRPr lang="de-DE" dirty="0">
+              <a:solidFill>
+                <a:schemeClr val="bg1"/>
+              </a:solidFill>
+            </a:endParaRPr>
+          </a:p>
+          <a:p>
+            <a:pPr algn="ctr"/>
+            <a:r>
+              <a:rPr lang="de-DE" dirty="0">
+                <a:solidFill>
+                  <a:schemeClr val="bg1"/>
+                </a:solidFill>
+              </a:rPr>
+              <a:t> w/</a:t>
+            </a:r>
+            <a:r>
+              <a:rPr lang="de-DE" dirty="0" err="1">
+                <a:solidFill>
+                  <a:schemeClr val="bg1"/>
+                </a:solidFill>
+              </a:rPr>
+              <a:t>embedded</a:t>
+            </a:r>
+            <a:r>
+              <a:rPr lang="de-DE" dirty="0">
+                <a:solidFill>
+                  <a:schemeClr val="bg1"/>
+                </a:solidFill>
+              </a:rPr>
+              <a:t> </a:t>
+            </a:r>
+            <a:r>
+              <a:rPr lang="de-DE" dirty="0" err="1">
+                <a:solidFill>
+                  <a:schemeClr val="bg1"/>
+                </a:solidFill>
+              </a:rPr>
+              <a:t>Tomcat</a:t>
+            </a:r>
+            <a:r>
+              <a:rPr lang="de-DE" dirty="0">
+                <a:solidFill>
+                  <a:schemeClr val="bg1"/>
+                </a:solidFill>
+              </a:rPr>
+              <a:t> &amp; DB</a:t>
+            </a:r>
+          </a:p>
+        </p:txBody>
+      </p:sp>
+      <p:sp>
+        <p:nvSpPr>
+          <p:cNvPr id="19" name="Pfeil: nach rechts 18">
+            <a:extLst>
+              <a:ext uri="{FF2B5EF4-FFF2-40B4-BE49-F238E27FC236}">
+                <a16:creationId xmlns:a16="http://schemas.microsoft.com/office/drawing/2014/main" id="{6A665729-F7A8-49CC-BBCD-1A947B48D62F}"/>
+              </a:ext>
+            </a:extLst>
+          </p:cNvPr>
+          <p:cNvSpPr/>
+          <p:nvPr/>
+        </p:nvSpPr>
+        <p:spPr>
+          <a:xfrm>
+            <a:off x="5976011" y="1763775"/>
+            <a:ext cx="3135320" cy="692728"/>
+          </a:xfrm>
+          <a:prstGeom prst="rightArrow">
+            <a:avLst/>
+          </a:prstGeom>
+        </p:spPr>
+        <p:style>
+          <a:lnRef idx="2">
+            <a:schemeClr val="accent1">
+              <a:shade val="50000"/>
+            </a:schemeClr>
+          </a:lnRef>
+          <a:fillRef idx="1">
+            <a:schemeClr val="accent1"/>
+          </a:fillRef>
+          <a:effectRef idx="0">
+            <a:schemeClr val="accent1"/>
+          </a:effectRef>
+          <a:fontRef idx="minor">
+            <a:schemeClr val="lt1"/>
+          </a:fontRef>
+        </p:style>
+        <p:txBody>
+          <a:bodyPr rtlCol="0" anchor="ctr"/>
+          <a:lstStyle/>
+          <a:p>
+            <a:r>
+              <a:rPr lang="de-DE" dirty="0">
+                <a:solidFill>
+                  <a:schemeClr val="tx1"/>
+                </a:solidFill>
+              </a:rPr>
+              <a:t>Run </a:t>
+            </a:r>
+            <a:r>
+              <a:rPr lang="de-DE" dirty="0" err="1">
+                <a:solidFill>
+                  <a:schemeClr val="tx1"/>
+                </a:solidFill>
+              </a:rPr>
+              <a:t>webui</a:t>
+            </a:r>
+            <a:r>
+              <a:rPr lang="de-DE" dirty="0">
+                <a:solidFill>
+                  <a:schemeClr val="tx1"/>
+                </a:solidFill>
+              </a:rPr>
+              <a:t> </a:t>
+            </a:r>
+            <a:r>
+              <a:rPr lang="de-DE" dirty="0" err="1">
+                <a:solidFill>
+                  <a:schemeClr val="tx1"/>
+                </a:solidFill>
+              </a:rPr>
+              <a:t>tests</a:t>
+            </a:r>
+            <a:r>
+              <a:rPr lang="de-DE" dirty="0">
+                <a:solidFill>
+                  <a:schemeClr val="tx1"/>
+                </a:solidFill>
+              </a:rPr>
+              <a:t> </a:t>
+            </a:r>
+            <a:r>
+              <a:rPr lang="de-DE" dirty="0" err="1">
+                <a:solidFill>
+                  <a:schemeClr val="tx1"/>
+                </a:solidFill>
+              </a:rPr>
+              <a:t>using</a:t>
+            </a:r>
+            <a:endParaRPr lang="de-DE" dirty="0">
+              <a:solidFill>
+                <a:schemeClr val="tx1"/>
+              </a:solidFill>
+            </a:endParaRPr>
+          </a:p>
+        </p:txBody>
+      </p:sp>
+      <p:sp>
+        <p:nvSpPr>
+          <p:cNvPr id="20" name="Pfeil: nach rechts 19">
+            <a:extLst>
+              <a:ext uri="{FF2B5EF4-FFF2-40B4-BE49-F238E27FC236}">
+                <a16:creationId xmlns:a16="http://schemas.microsoft.com/office/drawing/2014/main" id="{357B33C2-F828-49A9-9F71-CD4D75E0164F}"/>
+              </a:ext>
+            </a:extLst>
+          </p:cNvPr>
+          <p:cNvSpPr/>
+          <p:nvPr/>
+        </p:nvSpPr>
+        <p:spPr>
+          <a:xfrm>
+            <a:off x="5981827" y="2337348"/>
+            <a:ext cx="1925782" cy="692728"/>
+          </a:xfrm>
+          <a:prstGeom prst="rightArrow">
+            <a:avLst/>
+          </a:prstGeom>
+        </p:spPr>
+        <p:style>
+          <a:lnRef idx="2">
+            <a:schemeClr val="accent1">
+              <a:shade val="50000"/>
+            </a:schemeClr>
+          </a:lnRef>
+          <a:fillRef idx="1">
+            <a:schemeClr val="accent1"/>
+          </a:fillRef>
+          <a:effectRef idx="0">
+            <a:schemeClr val="accent1"/>
+          </a:effectRef>
+          <a:fontRef idx="minor">
+            <a:schemeClr val="lt1"/>
+          </a:fontRef>
+        </p:style>
+        <p:txBody>
+          <a:bodyPr rtlCol="0" anchor="ctr"/>
+          <a:lstStyle/>
+          <a:p>
+            <a:r>
+              <a:rPr lang="de-DE" dirty="0" err="1">
+                <a:solidFill>
+                  <a:schemeClr val="tx1"/>
+                </a:solidFill>
+              </a:rPr>
+              <a:t>Build</a:t>
+            </a:r>
+            <a:endParaRPr lang="de-DE" dirty="0">
+              <a:solidFill>
+                <a:schemeClr val="tx1"/>
+              </a:solidFill>
+            </a:endParaRPr>
+          </a:p>
+        </p:txBody>
+      </p:sp>
+      <p:sp>
+        <p:nvSpPr>
+          <p:cNvPr id="15" name="Pfeil: nach rechts 14">
+            <a:extLst>
+              <a:ext uri="{FF2B5EF4-FFF2-40B4-BE49-F238E27FC236}">
+                <a16:creationId xmlns:a16="http://schemas.microsoft.com/office/drawing/2014/main" id="{AA7AD6C8-E452-47A0-A4D4-FD34AC0091AD}"/>
+              </a:ext>
+            </a:extLst>
+          </p:cNvPr>
+          <p:cNvSpPr/>
+          <p:nvPr/>
+        </p:nvSpPr>
+        <p:spPr>
+          <a:xfrm>
+            <a:off x="5976012" y="703897"/>
+            <a:ext cx="3135320" cy="692728"/>
+          </a:xfrm>
+          <a:prstGeom prst="rightArrow">
+            <a:avLst/>
+          </a:prstGeom>
+        </p:spPr>
+        <p:style>
+          <a:lnRef idx="2">
+            <a:schemeClr val="accent1">
+              <a:shade val="50000"/>
+            </a:schemeClr>
+          </a:lnRef>
+          <a:fillRef idx="1">
+            <a:schemeClr val="accent1"/>
+          </a:fillRef>
+          <a:effectRef idx="0">
+            <a:schemeClr val="accent1"/>
+          </a:effectRef>
+          <a:fontRef idx="minor">
+            <a:schemeClr val="lt1"/>
+          </a:fontRef>
+        </p:style>
+        <p:txBody>
+          <a:bodyPr rtlCol="0" anchor="ctr"/>
+          <a:lstStyle/>
+          <a:p>
+            <a:r>
+              <a:rPr lang="de-DE" dirty="0" err="1">
+                <a:solidFill>
+                  <a:schemeClr val="tx1"/>
+                </a:solidFill>
+              </a:rPr>
+              <a:t>Build</a:t>
+            </a:r>
+            <a:r>
+              <a:rPr lang="de-DE" dirty="0">
+                <a:solidFill>
+                  <a:schemeClr val="tx1"/>
+                </a:solidFill>
+              </a:rPr>
+              <a:t> and </a:t>
+            </a:r>
+            <a:r>
+              <a:rPr lang="de-DE" dirty="0" err="1">
+                <a:solidFill>
+                  <a:schemeClr val="tx1"/>
+                </a:solidFill>
+              </a:rPr>
+              <a:t>start</a:t>
+            </a:r>
+            <a:r>
+              <a:rPr lang="de-DE" dirty="0">
+                <a:solidFill>
+                  <a:schemeClr val="tx1"/>
+                </a:solidFill>
+              </a:rPr>
+              <a:t>!</a:t>
+            </a:r>
+          </a:p>
+        </p:txBody>
+      </p:sp>
+      <p:sp>
+        <p:nvSpPr>
+          <p:cNvPr id="21" name="Pfeil: nach rechts 20">
+            <a:extLst>
+              <a:ext uri="{FF2B5EF4-FFF2-40B4-BE49-F238E27FC236}">
+                <a16:creationId xmlns:a16="http://schemas.microsoft.com/office/drawing/2014/main" id="{78F15629-48C7-43C2-B228-BEEDF5F44BBB}"/>
+              </a:ext>
+            </a:extLst>
+          </p:cNvPr>
+          <p:cNvSpPr/>
+          <p:nvPr/>
+        </p:nvSpPr>
+        <p:spPr>
+          <a:xfrm>
+            <a:off x="5970197" y="3914211"/>
+            <a:ext cx="3237655" cy="692728"/>
+          </a:xfrm>
+          <a:prstGeom prst="rightArrow">
+            <a:avLst/>
+          </a:prstGeom>
+        </p:spPr>
+        <p:style>
+          <a:lnRef idx="2">
+            <a:schemeClr val="accent1">
+              <a:shade val="50000"/>
+            </a:schemeClr>
+          </a:lnRef>
+          <a:fillRef idx="1">
+            <a:schemeClr val="accent1"/>
+          </a:fillRef>
+          <a:effectRef idx="0">
+            <a:schemeClr val="accent1"/>
+          </a:effectRef>
+          <a:fontRef idx="minor">
+            <a:schemeClr val="lt1"/>
+          </a:fontRef>
+        </p:style>
+        <p:txBody>
+          <a:bodyPr rtlCol="0" anchor="ctr"/>
+          <a:lstStyle/>
+          <a:p>
+            <a:r>
+              <a:rPr lang="de-DE" dirty="0">
+                <a:solidFill>
+                  <a:schemeClr val="tx1"/>
+                </a:solidFill>
+              </a:rPr>
+              <a:t>Run </a:t>
+            </a:r>
+            <a:r>
+              <a:rPr lang="de-DE" dirty="0" err="1">
+                <a:solidFill>
+                  <a:schemeClr val="tx1"/>
+                </a:solidFill>
+              </a:rPr>
+              <a:t>service</a:t>
+            </a:r>
+            <a:r>
+              <a:rPr lang="de-DE" dirty="0">
+                <a:solidFill>
+                  <a:schemeClr val="tx1"/>
+                </a:solidFill>
+              </a:rPr>
+              <a:t> </a:t>
+            </a:r>
+            <a:r>
+              <a:rPr lang="de-DE" dirty="0" err="1">
+                <a:solidFill>
+                  <a:schemeClr val="tx1"/>
+                </a:solidFill>
+              </a:rPr>
+              <a:t>tests</a:t>
+            </a:r>
+            <a:r>
+              <a:rPr lang="de-DE" dirty="0">
+                <a:solidFill>
+                  <a:schemeClr val="tx1"/>
+                </a:solidFill>
+              </a:rPr>
+              <a:t> </a:t>
+            </a:r>
+            <a:r>
+              <a:rPr lang="de-DE" dirty="0" err="1">
+                <a:solidFill>
+                  <a:schemeClr val="tx1"/>
+                </a:solidFill>
+              </a:rPr>
+              <a:t>using</a:t>
+            </a:r>
+            <a:endParaRPr lang="de-DE" dirty="0">
+              <a:solidFill>
+                <a:schemeClr val="tx1"/>
+              </a:solidFill>
+            </a:endParaRPr>
+          </a:p>
+        </p:txBody>
+      </p:sp>
+      <p:sp>
+        <p:nvSpPr>
+          <p:cNvPr id="8" name="Pfeil: nach rechts 7">
+            <a:extLst>
+              <a:ext uri="{FF2B5EF4-FFF2-40B4-BE49-F238E27FC236}">
+                <a16:creationId xmlns:a16="http://schemas.microsoft.com/office/drawing/2014/main" id="{0804092C-5C87-4879-9A5A-079BDA6ACC1D}"/>
+              </a:ext>
+            </a:extLst>
+          </p:cNvPr>
+          <p:cNvSpPr/>
+          <p:nvPr/>
+        </p:nvSpPr>
+        <p:spPr>
+          <a:xfrm>
+            <a:off x="5970197" y="4685006"/>
+            <a:ext cx="3226025" cy="692728"/>
+          </a:xfrm>
+          <a:prstGeom prst="rightArrow">
+            <a:avLst/>
+          </a:prstGeom>
+        </p:spPr>
+        <p:style>
+          <a:lnRef idx="2">
+            <a:schemeClr val="accent1">
+              <a:shade val="50000"/>
+            </a:schemeClr>
+          </a:lnRef>
+          <a:fillRef idx="1">
+            <a:schemeClr val="accent1"/>
+          </a:fillRef>
+          <a:effectRef idx="0">
+            <a:schemeClr val="accent1"/>
+          </a:effectRef>
+          <a:fontRef idx="minor">
+            <a:schemeClr val="lt1"/>
+          </a:fontRef>
+        </p:style>
+        <p:txBody>
+          <a:bodyPr rtlCol="0" anchor="ctr"/>
+          <a:lstStyle/>
+          <a:p>
+            <a:r>
+              <a:rPr lang="de-DE" dirty="0" err="1">
+                <a:solidFill>
+                  <a:schemeClr val="tx1"/>
+                </a:solidFill>
+              </a:rPr>
+              <a:t>Build</a:t>
+            </a:r>
+            <a:r>
+              <a:rPr lang="de-DE" dirty="0">
+                <a:solidFill>
+                  <a:schemeClr val="tx1"/>
+                </a:solidFill>
+              </a:rPr>
+              <a:t> </a:t>
+            </a:r>
+            <a:r>
+              <a:rPr lang="de-DE" dirty="0" err="1">
+                <a:solidFill>
+                  <a:schemeClr val="tx1"/>
+                </a:solidFill>
+              </a:rPr>
+              <a:t>overall</a:t>
+            </a:r>
+            <a:r>
+              <a:rPr lang="de-DE" dirty="0">
+                <a:solidFill>
+                  <a:schemeClr val="tx1"/>
+                </a:solidFill>
+              </a:rPr>
+              <a:t> </a:t>
+            </a:r>
+            <a:r>
+              <a:rPr lang="de-DE" dirty="0" err="1">
+                <a:solidFill>
+                  <a:schemeClr val="tx1"/>
+                </a:solidFill>
+              </a:rPr>
+              <a:t>application</a:t>
+            </a:r>
+            <a:endParaRPr lang="de-DE" dirty="0">
+              <a:solidFill>
+                <a:schemeClr val="tx1"/>
+              </a:solidFill>
+            </a:endParaRPr>
+          </a:p>
+        </p:txBody>
+      </p:sp>
+      <p:sp>
+        <p:nvSpPr>
+          <p:cNvPr id="22" name="Rechteck 21">
+            <a:extLst>
+              <a:ext uri="{FF2B5EF4-FFF2-40B4-BE49-F238E27FC236}">
+                <a16:creationId xmlns:a16="http://schemas.microsoft.com/office/drawing/2014/main" id="{96286F04-7D64-432D-A9A6-03E2C742A4DE}"/>
+              </a:ext>
+            </a:extLst>
+          </p:cNvPr>
+          <p:cNvSpPr/>
+          <p:nvPr/>
+        </p:nvSpPr>
+        <p:spPr>
+          <a:xfrm>
+            <a:off x="9259698" y="4685005"/>
+            <a:ext cx="1567419" cy="1492365"/>
+          </a:xfrm>
+          <a:prstGeom prst="rect">
+            <a:avLst/>
+          </a:prstGeom>
+          <a:solidFill>
+            <a:schemeClr val="tx1"/>
+          </a:solidFill>
+        </p:spPr>
+        <p:style>
+          <a:lnRef idx="2">
+            <a:schemeClr val="accent1">
+              <a:shade val="50000"/>
+            </a:schemeClr>
+          </a:lnRef>
+          <a:fillRef idx="1">
+            <a:schemeClr val="accent1"/>
+          </a:fillRef>
+          <a:effectRef idx="0">
+            <a:schemeClr val="accent1"/>
+          </a:effectRef>
+          <a:fontRef idx="minor">
+            <a:schemeClr val="lt1"/>
+          </a:fontRef>
+        </p:style>
+        <p:txBody>
+          <a:bodyPr rtlCol="0" anchor="ctr"/>
+          <a:lstStyle/>
+          <a:p>
+            <a:pPr algn="ctr"/>
+            <a:r>
+              <a:rPr lang="de-DE" dirty="0">
+                <a:solidFill>
+                  <a:schemeClr val="bg1"/>
+                </a:solidFill>
+              </a:rPr>
+              <a:t>Product-JAR w/</a:t>
+            </a:r>
+            <a:r>
+              <a:rPr lang="de-DE" dirty="0" err="1">
+                <a:solidFill>
+                  <a:schemeClr val="bg1"/>
+                </a:solidFill>
+              </a:rPr>
+              <a:t>embedded</a:t>
+            </a:r>
+            <a:r>
+              <a:rPr lang="de-DE" dirty="0">
+                <a:solidFill>
+                  <a:schemeClr val="bg1"/>
+                </a:solidFill>
+              </a:rPr>
+              <a:t> </a:t>
+            </a:r>
+            <a:r>
+              <a:rPr lang="de-DE" dirty="0" err="1">
+                <a:solidFill>
+                  <a:schemeClr val="bg1"/>
+                </a:solidFill>
+              </a:rPr>
+              <a:t>Tomcat</a:t>
+            </a:r>
+            <a:r>
+              <a:rPr lang="de-DE" dirty="0">
+                <a:solidFill>
+                  <a:schemeClr val="bg1"/>
+                </a:solidFill>
+              </a:rPr>
+              <a:t> &amp; DB</a:t>
+            </a:r>
+          </a:p>
+        </p:txBody>
+      </p:sp>
+      <p:sp>
+        <p:nvSpPr>
+          <p:cNvPr id="23" name="Rechteck 22">
+            <a:extLst>
+              <a:ext uri="{FF2B5EF4-FFF2-40B4-BE49-F238E27FC236}">
+                <a16:creationId xmlns:a16="http://schemas.microsoft.com/office/drawing/2014/main" id="{CE6EA9E6-F475-437E-AACD-FB6606CA4D23}"/>
+              </a:ext>
+            </a:extLst>
+          </p:cNvPr>
+          <p:cNvSpPr/>
+          <p:nvPr/>
+        </p:nvSpPr>
+        <p:spPr>
+          <a:xfrm>
+            <a:off x="263236" y="5574541"/>
+            <a:ext cx="5486401" cy="849826"/>
+          </a:xfrm>
+          <a:prstGeom prst="rect">
+            <a:avLst/>
+          </a:prstGeom>
+        </p:spPr>
+        <p:style>
+          <a:lnRef idx="2">
+            <a:schemeClr val="accent1">
+              <a:shade val="50000"/>
+            </a:schemeClr>
+          </a:lnRef>
+          <a:fillRef idx="1">
+            <a:schemeClr val="accent1"/>
+          </a:fillRef>
+          <a:effectRef idx="0">
+            <a:schemeClr val="accent1"/>
+          </a:effectRef>
+          <a:fontRef idx="minor">
+            <a:schemeClr val="lt1"/>
+          </a:fontRef>
+        </p:style>
+        <p:txBody>
+          <a:bodyPr rtlCol="0" anchor="ctr"/>
+          <a:lstStyle/>
+          <a:p>
+            <a:pPr algn="ctr"/>
+            <a:r>
+              <a:rPr lang="de-DE" dirty="0">
+                <a:solidFill>
+                  <a:schemeClr val="tx1"/>
+                </a:solidFill>
+              </a:rPr>
+              <a:t>System Test Project – </a:t>
+            </a:r>
+            <a:r>
+              <a:rPr lang="de-DE" dirty="0" err="1">
+                <a:solidFill>
+                  <a:schemeClr val="tx1"/>
+                </a:solidFill>
+              </a:rPr>
+              <a:t>Selenium</a:t>
+            </a:r>
+            <a:r>
+              <a:rPr lang="de-DE" dirty="0">
+                <a:solidFill>
+                  <a:schemeClr val="tx1"/>
+                </a:solidFill>
+              </a:rPr>
+              <a:t> Tests</a:t>
+            </a:r>
+          </a:p>
+          <a:p>
+            <a:pPr algn="ctr"/>
+            <a:r>
+              <a:rPr lang="de-DE" dirty="0" err="1">
+                <a:solidFill>
+                  <a:schemeClr val="tx1"/>
+                </a:solidFill>
+              </a:rPr>
+              <a:t>de.rdnp.preflight.test</a:t>
+            </a:r>
+            <a:endParaRPr lang="de-DE" i="1" dirty="0">
+              <a:solidFill>
+                <a:schemeClr val="tx1"/>
+              </a:solidFill>
+            </a:endParaRPr>
+          </a:p>
+        </p:txBody>
+      </p:sp>
+      <p:sp>
+        <p:nvSpPr>
+          <p:cNvPr id="24" name="Pfeil: nach rechts 23">
+            <a:extLst>
+              <a:ext uri="{FF2B5EF4-FFF2-40B4-BE49-F238E27FC236}">
+                <a16:creationId xmlns:a16="http://schemas.microsoft.com/office/drawing/2014/main" id="{36335172-B635-4E97-B288-9A04E25BB746}"/>
+              </a:ext>
+            </a:extLst>
+          </p:cNvPr>
+          <p:cNvSpPr/>
+          <p:nvPr/>
+        </p:nvSpPr>
+        <p:spPr>
+          <a:xfrm>
+            <a:off x="5970196" y="5653090"/>
+            <a:ext cx="3226025" cy="692728"/>
+          </a:xfrm>
+          <a:prstGeom prst="rightArrow">
+            <a:avLst/>
+          </a:prstGeom>
+        </p:spPr>
+        <p:style>
+          <a:lnRef idx="2">
+            <a:schemeClr val="accent1">
+              <a:shade val="50000"/>
+            </a:schemeClr>
+          </a:lnRef>
+          <a:fillRef idx="1">
+            <a:schemeClr val="accent1"/>
+          </a:fillRef>
+          <a:effectRef idx="0">
+            <a:schemeClr val="accent1"/>
+          </a:effectRef>
+          <a:fontRef idx="minor">
+            <a:schemeClr val="lt1"/>
+          </a:fontRef>
+        </p:style>
+        <p:txBody>
+          <a:bodyPr rtlCol="0" anchor="ctr"/>
+          <a:lstStyle/>
+          <a:p>
+            <a:r>
+              <a:rPr lang="de-DE" dirty="0">
+                <a:solidFill>
+                  <a:schemeClr val="tx1"/>
+                </a:solidFill>
+              </a:rPr>
+              <a:t>Run </a:t>
+            </a:r>
+            <a:r>
+              <a:rPr lang="de-DE" dirty="0" err="1">
+                <a:solidFill>
+                  <a:schemeClr val="tx1"/>
+                </a:solidFill>
+              </a:rPr>
+              <a:t>tests</a:t>
+            </a:r>
+            <a:endParaRPr lang="de-DE" dirty="0">
+              <a:solidFill>
+                <a:schemeClr val="tx1"/>
+              </a:solidFill>
+            </a:endParaRPr>
+          </a:p>
+        </p:txBody>
+      </p:sp>
+    </p:spTree>
+    <p:extLst>
+      <p:ext uri="{BB962C8B-B14F-4D97-AF65-F5344CB8AC3E}">
+        <p14:creationId xmlns:p14="http://schemas.microsoft.com/office/powerpoint/2010/main" val="2034121769"/>
+      </p:ext>
+    </p:extLst>
+  </p:cSld>
+  <p:clrMapOvr>
+    <a:masterClrMapping/>
+  </p:clrMapOvr>
+</p:sld>
+</file>
+
 <file path=ppt/theme/theme1.xml><?xml version="1.0" encoding="utf-8"?>
 <a:theme xmlns:a="http://schemas.openxmlformats.org/drawingml/2006/main" name="Office">
   <a:themeElements>

</xml_diff>

<commit_message>
Added an illustration of dynamic flow to the Drawings.pptx
</commit_message>
<xml_diff>
--- a/de.rdnp.preflight.architecture/doc/Drawings.pptx
+++ b/de.rdnp.preflight.architecture/doc/Drawings.pptx
@@ -10,6 +10,7 @@
     <p:sldId id="259" r:id="rId4"/>
     <p:sldId id="260" r:id="rId5"/>
     <p:sldId id="261" r:id="rId6"/>
+    <p:sldId id="262" r:id="rId7"/>
   </p:sldIdLst>
   <p:sldSz cx="12192000" cy="6858000"/>
   <p:notesSz cx="6858000" cy="9144000"/>
@@ -263,7 +264,7 @@
           <a:p>
             <a:fld id="{C4675E62-1FC4-4F30-8C85-2A3A0655F04F}" type="datetimeFigureOut">
               <a:rPr lang="de-DE" smtClean="0"/>
-              <a:t>07.12.2019</a:t>
+              <a:t>19.12.2019</a:t>
             </a:fld>
             <a:endParaRPr lang="de-DE"/>
           </a:p>
@@ -461,7 +462,7 @@
           <a:p>
             <a:fld id="{C4675E62-1FC4-4F30-8C85-2A3A0655F04F}" type="datetimeFigureOut">
               <a:rPr lang="de-DE" smtClean="0"/>
-              <a:t>07.12.2019</a:t>
+              <a:t>19.12.2019</a:t>
             </a:fld>
             <a:endParaRPr lang="de-DE"/>
           </a:p>
@@ -669,7 +670,7 @@
           <a:p>
             <a:fld id="{C4675E62-1FC4-4F30-8C85-2A3A0655F04F}" type="datetimeFigureOut">
               <a:rPr lang="de-DE" smtClean="0"/>
-              <a:t>07.12.2019</a:t>
+              <a:t>19.12.2019</a:t>
             </a:fld>
             <a:endParaRPr lang="de-DE"/>
           </a:p>
@@ -867,7 +868,7 @@
           <a:p>
             <a:fld id="{C4675E62-1FC4-4F30-8C85-2A3A0655F04F}" type="datetimeFigureOut">
               <a:rPr lang="de-DE" smtClean="0"/>
-              <a:t>07.12.2019</a:t>
+              <a:t>19.12.2019</a:t>
             </a:fld>
             <a:endParaRPr lang="de-DE"/>
           </a:p>
@@ -1142,7 +1143,7 @@
           <a:p>
             <a:fld id="{C4675E62-1FC4-4F30-8C85-2A3A0655F04F}" type="datetimeFigureOut">
               <a:rPr lang="de-DE" smtClean="0"/>
-              <a:t>07.12.2019</a:t>
+              <a:t>19.12.2019</a:t>
             </a:fld>
             <a:endParaRPr lang="de-DE"/>
           </a:p>
@@ -1407,7 +1408,7 @@
           <a:p>
             <a:fld id="{C4675E62-1FC4-4F30-8C85-2A3A0655F04F}" type="datetimeFigureOut">
               <a:rPr lang="de-DE" smtClean="0"/>
-              <a:t>07.12.2019</a:t>
+              <a:t>19.12.2019</a:t>
             </a:fld>
             <a:endParaRPr lang="de-DE"/>
           </a:p>
@@ -1819,7 +1820,7 @@
           <a:p>
             <a:fld id="{C4675E62-1FC4-4F30-8C85-2A3A0655F04F}" type="datetimeFigureOut">
               <a:rPr lang="de-DE" smtClean="0"/>
-              <a:t>07.12.2019</a:t>
+              <a:t>19.12.2019</a:t>
             </a:fld>
             <a:endParaRPr lang="de-DE"/>
           </a:p>
@@ -1960,7 +1961,7 @@
           <a:p>
             <a:fld id="{C4675E62-1FC4-4F30-8C85-2A3A0655F04F}" type="datetimeFigureOut">
               <a:rPr lang="de-DE" smtClean="0"/>
-              <a:t>07.12.2019</a:t>
+              <a:t>19.12.2019</a:t>
             </a:fld>
             <a:endParaRPr lang="de-DE"/>
           </a:p>
@@ -2073,7 +2074,7 @@
           <a:p>
             <a:fld id="{C4675E62-1FC4-4F30-8C85-2A3A0655F04F}" type="datetimeFigureOut">
               <a:rPr lang="de-DE" smtClean="0"/>
-              <a:t>07.12.2019</a:t>
+              <a:t>19.12.2019</a:t>
             </a:fld>
             <a:endParaRPr lang="de-DE"/>
           </a:p>
@@ -2384,7 +2385,7 @@
           <a:p>
             <a:fld id="{C4675E62-1FC4-4F30-8C85-2A3A0655F04F}" type="datetimeFigureOut">
               <a:rPr lang="de-DE" smtClean="0"/>
-              <a:t>07.12.2019</a:t>
+              <a:t>19.12.2019</a:t>
             </a:fld>
             <a:endParaRPr lang="de-DE"/>
           </a:p>
@@ -2672,7 +2673,7 @@
           <a:p>
             <a:fld id="{C4675E62-1FC4-4F30-8C85-2A3A0655F04F}" type="datetimeFigureOut">
               <a:rPr lang="de-DE" smtClean="0"/>
-              <a:t>07.12.2019</a:t>
+              <a:t>19.12.2019</a:t>
             </a:fld>
             <a:endParaRPr lang="de-DE"/>
           </a:p>
@@ -2913,7 +2914,7 @@
           <a:p>
             <a:fld id="{C4675E62-1FC4-4F30-8C85-2A3A0655F04F}" type="datetimeFigureOut">
               <a:rPr lang="de-DE" smtClean="0"/>
-              <a:t>07.12.2019</a:t>
+              <a:t>19.12.2019</a:t>
             </a:fld>
             <a:endParaRPr lang="de-DE"/>
           </a:p>
@@ -11187,6 +11188,792 @@
 </p:sld>
 </file>
 
+<file path=ppt/slides/slide6.xml><?xml version="1.0" encoding="utf-8"?>
+<p:sld xmlns:a="http://schemas.openxmlformats.org/drawingml/2006/main" xmlns:r="http://schemas.openxmlformats.org/officeDocument/2006/relationships" xmlns:p="http://schemas.openxmlformats.org/presentationml/2006/main">
+  <p:cSld>
+    <p:spTree>
+      <p:nvGrpSpPr>
+        <p:cNvPr id="1" name=""/>
+        <p:cNvGrpSpPr/>
+        <p:nvPr/>
+      </p:nvGrpSpPr>
+      <p:grpSpPr>
+        <a:xfrm>
+          <a:off x="0" y="0"/>
+          <a:ext cx="0" cy="0"/>
+          <a:chOff x="0" y="0"/>
+          <a:chExt cx="0" cy="0"/>
+        </a:xfrm>
+      </p:grpSpPr>
+      <p:sp>
+        <p:nvSpPr>
+          <p:cNvPr id="2" name="Rechteck 1">
+            <a:extLst>
+              <a:ext uri="{FF2B5EF4-FFF2-40B4-BE49-F238E27FC236}">
+                <a16:creationId xmlns:a16="http://schemas.microsoft.com/office/drawing/2014/main" id="{FB4B0D6D-5891-40C6-BE91-4CE912FC33A1}"/>
+              </a:ext>
+            </a:extLst>
+          </p:cNvPr>
+          <p:cNvSpPr/>
+          <p:nvPr/>
+        </p:nvSpPr>
+        <p:spPr>
+          <a:xfrm>
+            <a:off x="1020932" y="1091953"/>
+            <a:ext cx="1837678" cy="1305018"/>
+          </a:xfrm>
+          <a:prstGeom prst="rect">
+            <a:avLst/>
+          </a:prstGeom>
+        </p:spPr>
+        <p:style>
+          <a:lnRef idx="2">
+            <a:schemeClr val="accent1">
+              <a:shade val="50000"/>
+            </a:schemeClr>
+          </a:lnRef>
+          <a:fillRef idx="1">
+            <a:schemeClr val="accent1"/>
+          </a:fillRef>
+          <a:effectRef idx="0">
+            <a:schemeClr val="accent1"/>
+          </a:effectRef>
+          <a:fontRef idx="minor">
+            <a:schemeClr val="lt1"/>
+          </a:fontRef>
+        </p:style>
+        <p:txBody>
+          <a:bodyPr rtlCol="0" anchor="ctr"/>
+          <a:lstStyle/>
+          <a:p>
+            <a:pPr algn="ctr"/>
+            <a:r>
+              <a:rPr lang="de-DE" dirty="0">
+                <a:solidFill>
+                  <a:schemeClr val="tx1"/>
+                </a:solidFill>
+              </a:rPr>
+              <a:t>Web UI</a:t>
+            </a:r>
+          </a:p>
+        </p:txBody>
+      </p:sp>
+      <p:sp>
+        <p:nvSpPr>
+          <p:cNvPr id="3" name="Rechteck 2">
+            <a:extLst>
+              <a:ext uri="{FF2B5EF4-FFF2-40B4-BE49-F238E27FC236}">
+                <a16:creationId xmlns:a16="http://schemas.microsoft.com/office/drawing/2014/main" id="{26C119B7-529B-420B-B7B6-2040FC2A3670}"/>
+              </a:ext>
+            </a:extLst>
+          </p:cNvPr>
+          <p:cNvSpPr/>
+          <p:nvPr/>
+        </p:nvSpPr>
+        <p:spPr>
+          <a:xfrm>
+            <a:off x="4136995" y="1091953"/>
+            <a:ext cx="1837678" cy="1305018"/>
+          </a:xfrm>
+          <a:prstGeom prst="rect">
+            <a:avLst/>
+          </a:prstGeom>
+        </p:spPr>
+        <p:style>
+          <a:lnRef idx="2">
+            <a:schemeClr val="accent1">
+              <a:shade val="50000"/>
+            </a:schemeClr>
+          </a:lnRef>
+          <a:fillRef idx="1">
+            <a:schemeClr val="accent1"/>
+          </a:fillRef>
+          <a:effectRef idx="0">
+            <a:schemeClr val="accent1"/>
+          </a:effectRef>
+          <a:fontRef idx="minor">
+            <a:schemeClr val="lt1"/>
+          </a:fontRef>
+        </p:style>
+        <p:txBody>
+          <a:bodyPr rtlCol="0" anchor="ctr"/>
+          <a:lstStyle/>
+          <a:p>
+            <a:pPr algn="ctr"/>
+            <a:r>
+              <a:rPr lang="de-DE" dirty="0">
+                <a:solidFill>
+                  <a:schemeClr val="tx1"/>
+                </a:solidFill>
+              </a:rPr>
+              <a:t>Flight Editor </a:t>
+            </a:r>
+            <a:r>
+              <a:rPr lang="de-DE" dirty="0" err="1">
+                <a:solidFill>
+                  <a:schemeClr val="tx1"/>
+                </a:solidFill>
+              </a:rPr>
+              <a:t>Component</a:t>
+            </a:r>
+            <a:r>
+              <a:rPr lang="de-DE" dirty="0">
+                <a:solidFill>
+                  <a:schemeClr val="tx1"/>
+                </a:solidFill>
+              </a:rPr>
+              <a:t> (Model: Flight, Route Segments, Trip Segments)</a:t>
+            </a:r>
+          </a:p>
+        </p:txBody>
+      </p:sp>
+      <p:cxnSp>
+        <p:nvCxnSpPr>
+          <p:cNvPr id="5" name="Gerade Verbindung mit Pfeil 4">
+            <a:extLst>
+              <a:ext uri="{FF2B5EF4-FFF2-40B4-BE49-F238E27FC236}">
+                <a16:creationId xmlns:a16="http://schemas.microsoft.com/office/drawing/2014/main" id="{FC4A3FAD-B64E-46D8-9455-C310309A25B9}"/>
+              </a:ext>
+            </a:extLst>
+          </p:cNvPr>
+          <p:cNvCxnSpPr>
+            <a:cxnSpLocks/>
+          </p:cNvCxnSpPr>
+          <p:nvPr/>
+        </p:nvCxnSpPr>
+        <p:spPr>
+          <a:xfrm>
+            <a:off x="2858610" y="1349406"/>
+            <a:ext cx="1278385" cy="0"/>
+          </a:xfrm>
+          <a:prstGeom prst="straightConnector1">
+            <a:avLst/>
+          </a:prstGeom>
+          <a:ln>
+            <a:tailEnd type="triangle"/>
+          </a:ln>
+        </p:spPr>
+        <p:style>
+          <a:lnRef idx="1">
+            <a:schemeClr val="dk1"/>
+          </a:lnRef>
+          <a:fillRef idx="0">
+            <a:schemeClr val="dk1"/>
+          </a:fillRef>
+          <a:effectRef idx="0">
+            <a:schemeClr val="dk1"/>
+          </a:effectRef>
+          <a:fontRef idx="minor">
+            <a:schemeClr val="tx1"/>
+          </a:fontRef>
+        </p:style>
+      </p:cxnSp>
+      <p:sp>
+        <p:nvSpPr>
+          <p:cNvPr id="6" name="Textfeld 5">
+            <a:extLst>
+              <a:ext uri="{FF2B5EF4-FFF2-40B4-BE49-F238E27FC236}">
+                <a16:creationId xmlns:a16="http://schemas.microsoft.com/office/drawing/2014/main" id="{9F564F46-3CC5-4570-914E-E75919EAFE5F}"/>
+              </a:ext>
+            </a:extLst>
+          </p:cNvPr>
+          <p:cNvSpPr txBox="1"/>
+          <p:nvPr/>
+        </p:nvSpPr>
+        <p:spPr>
+          <a:xfrm>
+            <a:off x="2808351" y="1004471"/>
+            <a:ext cx="1378904" cy="1200329"/>
+          </a:xfrm>
+          <a:prstGeom prst="rect">
+            <a:avLst/>
+          </a:prstGeom>
+          <a:noFill/>
+        </p:spPr>
+        <p:txBody>
+          <a:bodyPr wrap="none" rtlCol="0">
+            <a:spAutoFit/>
+          </a:bodyPr>
+          <a:lstStyle/>
+          <a:p>
+            <a:r>
+              <a:rPr lang="de-DE" dirty="0"/>
+              <a:t>Send</a:t>
+            </a:r>
+            <a:br>
+              <a:rPr lang="de-DE" dirty="0"/>
+            </a:br>
+            <a:r>
+              <a:rPr lang="de-DE" dirty="0"/>
+              <a:t>UI </a:t>
+            </a:r>
+            <a:r>
+              <a:rPr lang="de-DE" dirty="0" err="1"/>
+              <a:t>input</a:t>
+            </a:r>
+            <a:endParaRPr lang="de-DE" dirty="0"/>
+          </a:p>
+          <a:p>
+            <a:r>
+              <a:rPr lang="de-DE" dirty="0"/>
+              <a:t>(via </a:t>
+            </a:r>
+            <a:r>
+              <a:rPr lang="de-DE" dirty="0" err="1"/>
+              <a:t>accessor</a:t>
+            </a:r>
+            <a:endParaRPr lang="de-DE" dirty="0"/>
+          </a:p>
+          <a:p>
+            <a:r>
+              <a:rPr lang="de-DE" dirty="0"/>
+              <a:t>Methods)</a:t>
+            </a:r>
+          </a:p>
+        </p:txBody>
+      </p:sp>
+      <p:sp>
+        <p:nvSpPr>
+          <p:cNvPr id="7" name="Rechteck 6">
+            <a:extLst>
+              <a:ext uri="{FF2B5EF4-FFF2-40B4-BE49-F238E27FC236}">
+                <a16:creationId xmlns:a16="http://schemas.microsoft.com/office/drawing/2014/main" id="{1CADF33F-2ADA-494F-94E4-8B122D0726A1}"/>
+              </a:ext>
+            </a:extLst>
+          </p:cNvPr>
+          <p:cNvSpPr/>
+          <p:nvPr/>
+        </p:nvSpPr>
+        <p:spPr>
+          <a:xfrm>
+            <a:off x="7883373" y="1094169"/>
+            <a:ext cx="1837678" cy="510467"/>
+          </a:xfrm>
+          <a:prstGeom prst="rect">
+            <a:avLst/>
+          </a:prstGeom>
+        </p:spPr>
+        <p:style>
+          <a:lnRef idx="2">
+            <a:schemeClr val="accent1">
+              <a:shade val="50000"/>
+            </a:schemeClr>
+          </a:lnRef>
+          <a:fillRef idx="1">
+            <a:schemeClr val="accent1"/>
+          </a:fillRef>
+          <a:effectRef idx="0">
+            <a:schemeClr val="accent1"/>
+          </a:effectRef>
+          <a:fontRef idx="minor">
+            <a:schemeClr val="lt1"/>
+          </a:fontRef>
+        </p:style>
+        <p:txBody>
+          <a:bodyPr rtlCol="0" anchor="ctr"/>
+          <a:lstStyle/>
+          <a:p>
+            <a:pPr algn="ctr"/>
+            <a:r>
+              <a:rPr lang="de-DE" dirty="0">
+                <a:solidFill>
+                  <a:schemeClr val="tx1"/>
+                </a:solidFill>
+              </a:rPr>
+              <a:t>Input </a:t>
+            </a:r>
+            <a:r>
+              <a:rPr lang="de-DE" dirty="0" err="1">
+                <a:solidFill>
+                  <a:schemeClr val="tx1"/>
+                </a:solidFill>
+              </a:rPr>
+              <a:t>Validator</a:t>
+            </a:r>
+            <a:endParaRPr lang="de-DE" dirty="0">
+              <a:solidFill>
+                <a:schemeClr val="tx1"/>
+              </a:solidFill>
+            </a:endParaRPr>
+          </a:p>
+        </p:txBody>
+      </p:sp>
+      <p:cxnSp>
+        <p:nvCxnSpPr>
+          <p:cNvPr id="9" name="Gerade Verbindung mit Pfeil 8">
+            <a:extLst>
+              <a:ext uri="{FF2B5EF4-FFF2-40B4-BE49-F238E27FC236}">
+                <a16:creationId xmlns:a16="http://schemas.microsoft.com/office/drawing/2014/main" id="{276A2D74-F7FB-4198-BED4-586CFFFD5A08}"/>
+              </a:ext>
+            </a:extLst>
+          </p:cNvPr>
+          <p:cNvCxnSpPr>
+            <a:cxnSpLocks/>
+            <a:endCxn id="7" idx="1"/>
+          </p:cNvCxnSpPr>
+          <p:nvPr/>
+        </p:nvCxnSpPr>
+        <p:spPr>
+          <a:xfrm>
+            <a:off x="5974673" y="1349403"/>
+            <a:ext cx="1908700" cy="0"/>
+          </a:xfrm>
+          <a:prstGeom prst="straightConnector1">
+            <a:avLst/>
+          </a:prstGeom>
+          <a:ln>
+            <a:tailEnd type="triangle"/>
+          </a:ln>
+        </p:spPr>
+        <p:style>
+          <a:lnRef idx="1">
+            <a:schemeClr val="dk1"/>
+          </a:lnRef>
+          <a:fillRef idx="0">
+            <a:schemeClr val="dk1"/>
+          </a:fillRef>
+          <a:effectRef idx="0">
+            <a:schemeClr val="dk1"/>
+          </a:effectRef>
+          <a:fontRef idx="minor">
+            <a:schemeClr val="tx1"/>
+          </a:fontRef>
+        </p:style>
+      </p:cxnSp>
+      <p:sp>
+        <p:nvSpPr>
+          <p:cNvPr id="12" name="Rechteck 11">
+            <a:extLst>
+              <a:ext uri="{FF2B5EF4-FFF2-40B4-BE49-F238E27FC236}">
+                <a16:creationId xmlns:a16="http://schemas.microsoft.com/office/drawing/2014/main" id="{4FBFBB6C-A1F0-4D93-9F4E-DEB6704DE3A2}"/>
+              </a:ext>
+            </a:extLst>
+          </p:cNvPr>
+          <p:cNvSpPr/>
+          <p:nvPr/>
+        </p:nvSpPr>
+        <p:spPr>
+          <a:xfrm>
+            <a:off x="7883373" y="1815438"/>
+            <a:ext cx="1837678" cy="510467"/>
+          </a:xfrm>
+          <a:prstGeom prst="rect">
+            <a:avLst/>
+          </a:prstGeom>
+        </p:spPr>
+        <p:style>
+          <a:lnRef idx="2">
+            <a:schemeClr val="accent1">
+              <a:shade val="50000"/>
+            </a:schemeClr>
+          </a:lnRef>
+          <a:fillRef idx="1">
+            <a:schemeClr val="accent1"/>
+          </a:fillRef>
+          <a:effectRef idx="0">
+            <a:schemeClr val="accent1"/>
+          </a:effectRef>
+          <a:fontRef idx="minor">
+            <a:schemeClr val="lt1"/>
+          </a:fontRef>
+        </p:style>
+        <p:txBody>
+          <a:bodyPr rtlCol="0" anchor="ctr"/>
+          <a:lstStyle/>
+          <a:p>
+            <a:pPr algn="ctr"/>
+            <a:r>
+              <a:rPr lang="de-DE" dirty="0">
+                <a:solidFill>
+                  <a:schemeClr val="tx1"/>
+                </a:solidFill>
+              </a:rPr>
+              <a:t>Trip Segment Manager</a:t>
+            </a:r>
+          </a:p>
+        </p:txBody>
+      </p:sp>
+      <p:cxnSp>
+        <p:nvCxnSpPr>
+          <p:cNvPr id="13" name="Gerade Verbindung mit Pfeil 12">
+            <a:extLst>
+              <a:ext uri="{FF2B5EF4-FFF2-40B4-BE49-F238E27FC236}">
+                <a16:creationId xmlns:a16="http://schemas.microsoft.com/office/drawing/2014/main" id="{308C5597-52EC-42F0-8993-64704259EC53}"/>
+              </a:ext>
+            </a:extLst>
+          </p:cNvPr>
+          <p:cNvCxnSpPr>
+            <a:cxnSpLocks/>
+            <a:endCxn id="12" idx="1"/>
+          </p:cNvCxnSpPr>
+          <p:nvPr/>
+        </p:nvCxnSpPr>
+        <p:spPr>
+          <a:xfrm>
+            <a:off x="5974672" y="2070672"/>
+            <a:ext cx="1908701" cy="0"/>
+          </a:xfrm>
+          <a:prstGeom prst="straightConnector1">
+            <a:avLst/>
+          </a:prstGeom>
+          <a:ln>
+            <a:tailEnd type="triangle"/>
+          </a:ln>
+        </p:spPr>
+        <p:style>
+          <a:lnRef idx="1">
+            <a:schemeClr val="dk1"/>
+          </a:lnRef>
+          <a:fillRef idx="0">
+            <a:schemeClr val="dk1"/>
+          </a:fillRef>
+          <a:effectRef idx="0">
+            <a:schemeClr val="dk1"/>
+          </a:effectRef>
+          <a:fontRef idx="minor">
+            <a:schemeClr val="tx1"/>
+          </a:fontRef>
+        </p:style>
+      </p:cxnSp>
+      <p:sp>
+        <p:nvSpPr>
+          <p:cNvPr id="15" name="Rechteck 14">
+            <a:extLst>
+              <a:ext uri="{FF2B5EF4-FFF2-40B4-BE49-F238E27FC236}">
+                <a16:creationId xmlns:a16="http://schemas.microsoft.com/office/drawing/2014/main" id="{6F81F931-2252-4CBF-AB48-024C53E0BE1B}"/>
+              </a:ext>
+            </a:extLst>
+          </p:cNvPr>
+          <p:cNvSpPr/>
+          <p:nvPr/>
+        </p:nvSpPr>
+        <p:spPr>
+          <a:xfrm>
+            <a:off x="4136995" y="3715307"/>
+            <a:ext cx="1837677" cy="1305018"/>
+          </a:xfrm>
+          <a:prstGeom prst="rect">
+            <a:avLst/>
+          </a:prstGeom>
+        </p:spPr>
+        <p:style>
+          <a:lnRef idx="2">
+            <a:schemeClr val="accent1">
+              <a:shade val="50000"/>
+            </a:schemeClr>
+          </a:lnRef>
+          <a:fillRef idx="1">
+            <a:schemeClr val="accent1"/>
+          </a:fillRef>
+          <a:effectRef idx="0">
+            <a:schemeClr val="accent1"/>
+          </a:effectRef>
+          <a:fontRef idx="minor">
+            <a:schemeClr val="lt1"/>
+          </a:fontRef>
+        </p:style>
+        <p:txBody>
+          <a:bodyPr rtlCol="0" anchor="ctr"/>
+          <a:lstStyle/>
+          <a:p>
+            <a:pPr algn="ctr"/>
+            <a:r>
+              <a:rPr lang="de-DE" dirty="0">
+                <a:solidFill>
+                  <a:schemeClr val="tx1"/>
+                </a:solidFill>
+              </a:rPr>
+              <a:t>Trip Computer Service</a:t>
+            </a:r>
+          </a:p>
+        </p:txBody>
+      </p:sp>
+      <p:sp>
+        <p:nvSpPr>
+          <p:cNvPr id="17" name="Textfeld 16">
+            <a:extLst>
+              <a:ext uri="{FF2B5EF4-FFF2-40B4-BE49-F238E27FC236}">
+                <a16:creationId xmlns:a16="http://schemas.microsoft.com/office/drawing/2014/main" id="{39AB554B-B695-4416-AE9F-580CAC7A9BDC}"/>
+              </a:ext>
+            </a:extLst>
+          </p:cNvPr>
+          <p:cNvSpPr txBox="1"/>
+          <p:nvPr/>
+        </p:nvSpPr>
+        <p:spPr>
+          <a:xfrm>
+            <a:off x="5974670" y="1023105"/>
+            <a:ext cx="1510157" cy="646331"/>
+          </a:xfrm>
+          <a:prstGeom prst="rect">
+            <a:avLst/>
+          </a:prstGeom>
+          <a:noFill/>
+        </p:spPr>
+        <p:txBody>
+          <a:bodyPr wrap="none" rtlCol="0">
+            <a:spAutoFit/>
+          </a:bodyPr>
+          <a:lstStyle/>
+          <a:p>
+            <a:r>
+              <a:rPr lang="de-DE" dirty="0"/>
+              <a:t>Send UI </a:t>
+            </a:r>
+            <a:r>
+              <a:rPr lang="de-DE" dirty="0" err="1"/>
+              <a:t>input</a:t>
+            </a:r>
+            <a:r>
+              <a:rPr lang="de-DE" dirty="0"/>
+              <a:t> </a:t>
+            </a:r>
+            <a:br>
+              <a:rPr lang="de-DE" dirty="0"/>
+            </a:br>
+            <a:r>
+              <a:rPr lang="de-DE" dirty="0" err="1"/>
+              <a:t>data</a:t>
+            </a:r>
+            <a:r>
+              <a:rPr lang="de-DE" dirty="0"/>
+              <a:t> </a:t>
+            </a:r>
+            <a:r>
+              <a:rPr lang="de-DE" dirty="0" err="1"/>
+              <a:t>for</a:t>
+            </a:r>
+            <a:r>
+              <a:rPr lang="de-DE" dirty="0"/>
+              <a:t> check</a:t>
+            </a:r>
+          </a:p>
+        </p:txBody>
+      </p:sp>
+      <p:sp>
+        <p:nvSpPr>
+          <p:cNvPr id="18" name="Textfeld 17">
+            <a:extLst>
+              <a:ext uri="{FF2B5EF4-FFF2-40B4-BE49-F238E27FC236}">
+                <a16:creationId xmlns:a16="http://schemas.microsoft.com/office/drawing/2014/main" id="{47DED8D7-331C-4587-AD8F-5E86A3D4523E}"/>
+              </a:ext>
+            </a:extLst>
+          </p:cNvPr>
+          <p:cNvSpPr txBox="1"/>
+          <p:nvPr/>
+        </p:nvSpPr>
+        <p:spPr>
+          <a:xfrm>
+            <a:off x="5974670" y="1718735"/>
+            <a:ext cx="1837677" cy="923330"/>
+          </a:xfrm>
+          <a:prstGeom prst="rect">
+            <a:avLst/>
+          </a:prstGeom>
+          <a:noFill/>
+        </p:spPr>
+        <p:txBody>
+          <a:bodyPr wrap="square" rtlCol="0">
+            <a:spAutoFit/>
+          </a:bodyPr>
+          <a:lstStyle/>
+          <a:p>
+            <a:r>
+              <a:rPr lang="de-DE" dirty="0" err="1"/>
+              <a:t>Requests</a:t>
+            </a:r>
+            <a:r>
+              <a:rPr lang="de-DE" dirty="0"/>
+              <a:t> </a:t>
+            </a:r>
+            <a:r>
+              <a:rPr lang="de-DE" dirty="0" err="1"/>
+              <a:t>add</a:t>
+            </a:r>
+            <a:r>
+              <a:rPr lang="de-DE" dirty="0"/>
+              <a:t>, </a:t>
+            </a:r>
+            <a:r>
+              <a:rPr lang="de-DE" dirty="0" err="1"/>
+              <a:t>remove</a:t>
+            </a:r>
+            <a:r>
+              <a:rPr lang="de-DE" dirty="0"/>
+              <a:t>, </a:t>
+            </a:r>
+            <a:r>
+              <a:rPr lang="de-DE" dirty="0" err="1"/>
+              <a:t>lookup</a:t>
+            </a:r>
+            <a:r>
+              <a:rPr lang="de-DE" dirty="0"/>
+              <a:t> on </a:t>
+            </a:r>
+            <a:r>
+              <a:rPr lang="de-DE" dirty="0" err="1"/>
+              <a:t>data</a:t>
+            </a:r>
+            <a:r>
+              <a:rPr lang="de-DE" dirty="0"/>
+              <a:t> </a:t>
+            </a:r>
+            <a:r>
+              <a:rPr lang="de-DE" dirty="0" err="1"/>
+              <a:t>model</a:t>
+            </a:r>
+            <a:endParaRPr lang="de-DE" dirty="0"/>
+          </a:p>
+        </p:txBody>
+      </p:sp>
+      <p:cxnSp>
+        <p:nvCxnSpPr>
+          <p:cNvPr id="23" name="Gerade Verbindung mit Pfeil 22">
+            <a:extLst>
+              <a:ext uri="{FF2B5EF4-FFF2-40B4-BE49-F238E27FC236}">
+                <a16:creationId xmlns:a16="http://schemas.microsoft.com/office/drawing/2014/main" id="{43432252-ABC3-4C61-BAA4-D1CE15A1C2C8}"/>
+              </a:ext>
+            </a:extLst>
+          </p:cNvPr>
+          <p:cNvCxnSpPr/>
+          <p:nvPr/>
+        </p:nvCxnSpPr>
+        <p:spPr>
+          <a:xfrm>
+            <a:off x="5055833" y="2396971"/>
+            <a:ext cx="0" cy="1293529"/>
+          </a:xfrm>
+          <a:prstGeom prst="straightConnector1">
+            <a:avLst/>
+          </a:prstGeom>
+          <a:ln>
+            <a:tailEnd type="triangle"/>
+          </a:ln>
+        </p:spPr>
+        <p:style>
+          <a:lnRef idx="1">
+            <a:schemeClr val="dk1"/>
+          </a:lnRef>
+          <a:fillRef idx="0">
+            <a:schemeClr val="dk1"/>
+          </a:fillRef>
+          <a:effectRef idx="0">
+            <a:schemeClr val="dk1"/>
+          </a:effectRef>
+          <a:fontRef idx="minor">
+            <a:schemeClr val="tx1"/>
+          </a:fontRef>
+        </p:style>
+      </p:cxnSp>
+      <p:sp>
+        <p:nvSpPr>
+          <p:cNvPr id="24" name="Textfeld 23">
+            <a:extLst>
+              <a:ext uri="{FF2B5EF4-FFF2-40B4-BE49-F238E27FC236}">
+                <a16:creationId xmlns:a16="http://schemas.microsoft.com/office/drawing/2014/main" id="{EC6092E2-C46A-4EA4-8E46-3C1964668F13}"/>
+              </a:ext>
+            </a:extLst>
+          </p:cNvPr>
+          <p:cNvSpPr txBox="1"/>
+          <p:nvPr/>
+        </p:nvSpPr>
+        <p:spPr>
+          <a:xfrm>
+            <a:off x="5055831" y="2578522"/>
+            <a:ext cx="1837677" cy="1200329"/>
+          </a:xfrm>
+          <a:prstGeom prst="rect">
+            <a:avLst/>
+          </a:prstGeom>
+          <a:noFill/>
+        </p:spPr>
+        <p:txBody>
+          <a:bodyPr wrap="square" rtlCol="0">
+            <a:spAutoFit/>
+          </a:bodyPr>
+          <a:lstStyle/>
+          <a:p>
+            <a:r>
+              <a:rPr lang="de-DE" dirty="0"/>
+              <a:t>Send </a:t>
+            </a:r>
+            <a:r>
+              <a:rPr lang="de-DE" dirty="0" err="1"/>
+              <a:t>data</a:t>
+            </a:r>
+            <a:r>
+              <a:rPr lang="de-DE" dirty="0"/>
+              <a:t> </a:t>
+            </a:r>
+            <a:r>
+              <a:rPr lang="de-DE" dirty="0" err="1"/>
+              <a:t>model</a:t>
+            </a:r>
+            <a:r>
+              <a:rPr lang="de-DE" dirty="0"/>
+              <a:t> </a:t>
+            </a:r>
+            <a:r>
+              <a:rPr lang="de-DE" dirty="0" err="1"/>
+              <a:t>with</a:t>
+            </a:r>
+            <a:r>
+              <a:rPr lang="de-DE" dirty="0"/>
+              <a:t> valid UI </a:t>
+            </a:r>
+            <a:r>
+              <a:rPr lang="de-DE" dirty="0" err="1"/>
+              <a:t>input</a:t>
+            </a:r>
+            <a:r>
+              <a:rPr lang="de-DE" dirty="0"/>
+              <a:t> </a:t>
+            </a:r>
+            <a:r>
+              <a:rPr lang="de-DE" dirty="0" err="1"/>
+              <a:t>for</a:t>
+            </a:r>
+            <a:r>
+              <a:rPr lang="de-DE" dirty="0"/>
+              <a:t> </a:t>
+            </a:r>
+            <a:r>
+              <a:rPr lang="de-DE" dirty="0" err="1"/>
+              <a:t>filling</a:t>
+            </a:r>
+            <a:r>
+              <a:rPr lang="de-DE" dirty="0"/>
+              <a:t> </a:t>
+            </a:r>
+            <a:r>
+              <a:rPr lang="de-DE" dirty="0" err="1"/>
+              <a:t>derived</a:t>
+            </a:r>
+            <a:r>
+              <a:rPr lang="de-DE" dirty="0"/>
+              <a:t> </a:t>
+            </a:r>
+            <a:r>
+              <a:rPr lang="de-DE" dirty="0" err="1"/>
+              <a:t>values</a:t>
+            </a:r>
+            <a:endParaRPr lang="de-DE" dirty="0"/>
+          </a:p>
+        </p:txBody>
+      </p:sp>
+    </p:spTree>
+    <p:extLst>
+      <p:ext uri="{BB962C8B-B14F-4D97-AF65-F5344CB8AC3E}">
+        <p14:creationId xmlns:p14="http://schemas.microsoft.com/office/powerpoint/2010/main" val="2574485548"/>
+      </p:ext>
+    </p:extLst>
+  </p:cSld>
+  <p:clrMapOvr>
+    <a:masterClrMapping/>
+  </p:clrMapOvr>
+</p:sld>
+</file>
+
 <file path=ppt/theme/theme1.xml><?xml version="1.0" encoding="utf-8"?>
 <a:theme xmlns:a="http://schemas.openxmlformats.org/drawingml/2006/main" name="Office">
   <a:themeElements>

</xml_diff>